<commit_message>
Added changelog and ignore
</commit_message>
<xml_diff>
--- a/plan_presentation.pptx
+++ b/plan_presentation.pptx
@@ -4,6 +4,23 @@
   <p:sldMasterIdLst>
     <p:sldMasterId id="2147483648" r:id="rId1"/>
   </p:sldMasterIdLst>
+  <p:sldIdLst>
+    <p:sldId id="256" r:id="rId7"/>
+    <p:sldId id="257" r:id="rId8"/>
+    <p:sldId id="258" r:id="rId9"/>
+    <p:sldId id="259" r:id="rId10"/>
+    <p:sldId id="260" r:id="rId11"/>
+    <p:sldId id="261" r:id="rId12"/>
+    <p:sldId id="262" r:id="rId13"/>
+    <p:sldId id="263" r:id="rId14"/>
+    <p:sldId id="264" r:id="rId15"/>
+    <p:sldId id="265" r:id="rId16"/>
+    <p:sldId id="266" r:id="rId17"/>
+    <p:sldId id="267" r:id="rId18"/>
+    <p:sldId id="268" r:id="rId19"/>
+    <p:sldId id="269" r:id="rId20"/>
+    <p:sldId id="270" r:id="rId21"/>
+  </p:sldIdLst>
   <p:sldSz cx="9144000" cy="6858000" type="screen4x3"/>
   <p:notesSz cx="6858000" cy="9144000"/>
   <p:defaultTextStyle>
@@ -3073,6 +3090,1131 @@
     </p:otherStyle>
   </p:txStyles>
 </p:sldMaster>
+</file>
+
+<file path=ppt/slides/slide1.xml><?xml version="1.0" encoding="utf-8"?>
+<p:sld xmlns:a="http://schemas.openxmlformats.org/drawingml/2006/main" xmlns:p="http://schemas.openxmlformats.org/presentationml/2006/main" xmlns:r="http://schemas.openxmlformats.org/officeDocument/2006/relationships">
+  <p:cSld>
+    <p:spTree>
+      <p:nvGrpSpPr>
+        <p:cNvPr id="1" name=""/>
+        <p:cNvGrpSpPr/>
+        <p:nvPr/>
+      </p:nvGrpSpPr>
+      <p:grpSpPr/>
+      <p:sp>
+        <p:nvSpPr>
+          <p:cNvPr id="2" name="Title 1"/>
+          <p:cNvSpPr>
+            <a:spLocks noGrp="1"/>
+          </p:cNvSpPr>
+          <p:nvPr>
+            <p:ph type="title"/>
+          </p:nvPr>
+        </p:nvSpPr>
+        <p:spPr/>
+        <p:txBody>
+          <a:bodyPr/>
+          <a:lstStyle/>
+          <a:p>
+            <a:r>
+              <a:t> Project Initiation &amp; Planning </a:t>
+            </a:r>
+          </a:p>
+        </p:txBody>
+      </p:sp>
+      <p:sp>
+        <p:nvSpPr>
+          <p:cNvPr id="3" name="Content Placeholder 2"/>
+          <p:cNvSpPr>
+            <a:spLocks noGrp="1"/>
+          </p:cNvSpPr>
+          <p:nvPr>
+            <p:ph idx="1"/>
+          </p:nvPr>
+        </p:nvSpPr>
+        <p:spPr/>
+        <p:txBody>
+          <a:bodyPr/>
+          <a:lstStyle/>
+          <a:p>
+            <a:r>
+              <a:t>Duration  1 week </a:t>
+            </a:r>
+          </a:p>
+          <a:p>
+            <a:r>
+              <a:t>Dependencies:  None </a:t>
+            </a:r>
+          </a:p>
+          <a:p>
+            <a:r>
+              <a:t>Status:  Not Started </a:t>
+            </a:r>
+          </a:p>
+          <a:p>
+            <a:r>
+              <a:t>Resources:  Project Manager </a:t>
+            </a:r>
+          </a:p>
+        </p:txBody>
+      </p:sp>
+    </p:spTree>
+  </p:cSld>
+  <p:clrMapOvr>
+    <a:masterClrMapping/>
+  </p:clrMapOvr>
+</p:sld>
+</file>
+
+<file path=ppt/slides/slide10.xml><?xml version="1.0" encoding="utf-8"?>
+<p:sld xmlns:a="http://schemas.openxmlformats.org/drawingml/2006/main" xmlns:p="http://schemas.openxmlformats.org/presentationml/2006/main" xmlns:r="http://schemas.openxmlformats.org/officeDocument/2006/relationships">
+  <p:cSld>
+    <p:spTree>
+      <p:nvGrpSpPr>
+        <p:cNvPr id="1" name=""/>
+        <p:cNvGrpSpPr/>
+        <p:nvPr/>
+      </p:nvGrpSpPr>
+      <p:grpSpPr/>
+      <p:sp>
+        <p:nvSpPr>
+          <p:cNvPr id="2" name="Title 1"/>
+          <p:cNvSpPr>
+            <a:spLocks noGrp="1"/>
+          </p:cNvSpPr>
+          <p:nvPr>
+            <p:ph type="title"/>
+          </p:nvPr>
+        </p:nvSpPr>
+        <p:spPr/>
+        <p:txBody>
+          <a:bodyPr/>
+          <a:lstStyle/>
+          <a:p>
+            <a:r>
+              <a:t> User Documentation &amp; Onboarding Guides </a:t>
+            </a:r>
+          </a:p>
+        </p:txBody>
+      </p:sp>
+      <p:sp>
+        <p:nvSpPr>
+          <p:cNvPr id="3" name="Content Placeholder 2"/>
+          <p:cNvSpPr>
+            <a:spLocks noGrp="1"/>
+          </p:cNvSpPr>
+          <p:nvPr>
+            <p:ph idx="1"/>
+          </p:nvPr>
+        </p:nvSpPr>
+        <p:spPr/>
+        <p:txBody>
+          <a:bodyPr/>
+          <a:lstStyle/>
+          <a:p>
+            <a:r>
+              <a:t>Duration  2 weeks </a:t>
+            </a:r>
+          </a:p>
+          <a:p>
+            <a:r>
+              <a:t>Dependencies:  Quality Assurance &amp; Testing </a:t>
+            </a:r>
+          </a:p>
+          <a:p>
+            <a:r>
+              <a:t>Status:  Not Started </a:t>
+            </a:r>
+          </a:p>
+          <a:p>
+            <a:r>
+              <a:t>Resources:  Technical Writer </a:t>
+            </a:r>
+          </a:p>
+        </p:txBody>
+      </p:sp>
+    </p:spTree>
+  </p:cSld>
+  <p:clrMapOvr>
+    <a:masterClrMapping/>
+  </p:clrMapOvr>
+</p:sld>
+</file>
+
+<file path=ppt/slides/slide11.xml><?xml version="1.0" encoding="utf-8"?>
+<p:sld xmlns:a="http://schemas.openxmlformats.org/drawingml/2006/main" xmlns:p="http://schemas.openxmlformats.org/presentationml/2006/main" xmlns:r="http://schemas.openxmlformats.org/officeDocument/2006/relationships">
+  <p:cSld>
+    <p:spTree>
+      <p:nvGrpSpPr>
+        <p:cNvPr id="1" name=""/>
+        <p:cNvGrpSpPr/>
+        <p:nvPr/>
+      </p:nvGrpSpPr>
+      <p:grpSpPr/>
+      <p:sp>
+        <p:nvSpPr>
+          <p:cNvPr id="2" name="Title 1"/>
+          <p:cNvSpPr>
+            <a:spLocks noGrp="1"/>
+          </p:cNvSpPr>
+          <p:nvPr>
+            <p:ph type="title"/>
+          </p:nvPr>
+        </p:nvSpPr>
+        <p:spPr/>
+        <p:txBody>
+          <a:bodyPr/>
+          <a:lstStyle/>
+          <a:p>
+            <a:r>
+              <a:t> Deployment of Backend </a:t>
+            </a:r>
+          </a:p>
+        </p:txBody>
+      </p:sp>
+      <p:sp>
+        <p:nvSpPr>
+          <p:cNvPr id="3" name="Content Placeholder 2"/>
+          <p:cNvSpPr>
+            <a:spLocks noGrp="1"/>
+          </p:cNvSpPr>
+          <p:nvPr>
+            <p:ph idx="1"/>
+          </p:nvPr>
+        </p:nvSpPr>
+        <p:spPr/>
+        <p:txBody>
+          <a:bodyPr/>
+          <a:lstStyle/>
+          <a:p>
+            <a:r>
+              <a:t>Duration  1 week </a:t>
+            </a:r>
+          </a:p>
+          <a:p>
+            <a:r>
+              <a:t>Dependencies:  Quality Assurance &amp; Testing </a:t>
+            </a:r>
+          </a:p>
+          <a:p>
+            <a:r>
+              <a:t>Status:  Not Started </a:t>
+            </a:r>
+          </a:p>
+          <a:p>
+            <a:r>
+              <a:t>Resources:  DevOps Team </a:t>
+            </a:r>
+          </a:p>
+        </p:txBody>
+      </p:sp>
+    </p:spTree>
+  </p:cSld>
+  <p:clrMapOvr>
+    <a:masterClrMapping/>
+  </p:clrMapOvr>
+</p:sld>
+</file>
+
+<file path=ppt/slides/slide12.xml><?xml version="1.0" encoding="utf-8"?>
+<p:sld xmlns:a="http://schemas.openxmlformats.org/drawingml/2006/main" xmlns:p="http://schemas.openxmlformats.org/presentationml/2006/main" xmlns:r="http://schemas.openxmlformats.org/officeDocument/2006/relationships">
+  <p:cSld>
+    <p:spTree>
+      <p:nvGrpSpPr>
+        <p:cNvPr id="1" name=""/>
+        <p:cNvGrpSpPr/>
+        <p:nvPr/>
+      </p:nvGrpSpPr>
+      <p:grpSpPr/>
+      <p:sp>
+        <p:nvSpPr>
+          <p:cNvPr id="2" name="Title 1"/>
+          <p:cNvSpPr>
+            <a:spLocks noGrp="1"/>
+          </p:cNvSpPr>
+          <p:nvPr>
+            <p:ph type="title"/>
+          </p:nvPr>
+        </p:nvSpPr>
+        <p:spPr/>
+        <p:txBody>
+          <a:bodyPr/>
+          <a:lstStyle/>
+          <a:p>
+            <a:r>
+              <a:t> App Store Submission (iOS &amp; Android) </a:t>
+            </a:r>
+          </a:p>
+        </p:txBody>
+      </p:sp>
+      <p:sp>
+        <p:nvSpPr>
+          <p:cNvPr id="3" name="Content Placeholder 2"/>
+          <p:cNvSpPr>
+            <a:spLocks noGrp="1"/>
+          </p:cNvSpPr>
+          <p:nvPr>
+            <p:ph idx="1"/>
+          </p:nvPr>
+        </p:nvSpPr>
+        <p:spPr/>
+        <p:txBody>
+          <a:bodyPr/>
+          <a:lstStyle/>
+          <a:p>
+            <a:r>
+              <a:t>Duration  1 week </a:t>
+            </a:r>
+          </a:p>
+          <a:p>
+            <a:r>
+              <a:t>Dependencies:  Quality Assurance &amp; Testing, Deployment of Backend </a:t>
+            </a:r>
+          </a:p>
+          <a:p>
+            <a:r>
+              <a:t>Status:  Not Started </a:t>
+            </a:r>
+          </a:p>
+          <a:p>
+            <a:r>
+              <a:t>Resources:  Project Manager </a:t>
+            </a:r>
+          </a:p>
+        </p:txBody>
+      </p:sp>
+    </p:spTree>
+  </p:cSld>
+  <p:clrMapOvr>
+    <a:masterClrMapping/>
+  </p:clrMapOvr>
+</p:sld>
+</file>
+
+<file path=ppt/slides/slide13.xml><?xml version="1.0" encoding="utf-8"?>
+<p:sld xmlns:a="http://schemas.openxmlformats.org/drawingml/2006/main" xmlns:p="http://schemas.openxmlformats.org/presentationml/2006/main" xmlns:r="http://schemas.openxmlformats.org/officeDocument/2006/relationships">
+  <p:cSld>
+    <p:spTree>
+      <p:nvGrpSpPr>
+        <p:cNvPr id="1" name=""/>
+        <p:cNvGrpSpPr/>
+        <p:nvPr/>
+      </p:nvGrpSpPr>
+      <p:grpSpPr/>
+      <p:sp>
+        <p:nvSpPr>
+          <p:cNvPr id="2" name="Title 1"/>
+          <p:cNvSpPr>
+            <a:spLocks noGrp="1"/>
+          </p:cNvSpPr>
+          <p:nvPr>
+            <p:ph type="title"/>
+          </p:nvPr>
+        </p:nvSpPr>
+        <p:spPr/>
+        <p:txBody>
+          <a:bodyPr/>
+          <a:lstStyle/>
+          <a:p>
+            <a:r>
+              <a:t> Marketing &amp; Launch Preparation </a:t>
+            </a:r>
+          </a:p>
+        </p:txBody>
+      </p:sp>
+      <p:sp>
+        <p:nvSpPr>
+          <p:cNvPr id="3" name="Content Placeholder 2"/>
+          <p:cNvSpPr>
+            <a:spLocks noGrp="1"/>
+          </p:cNvSpPr>
+          <p:nvPr>
+            <p:ph idx="1"/>
+          </p:nvPr>
+        </p:nvSpPr>
+        <p:spPr/>
+        <p:txBody>
+          <a:bodyPr/>
+          <a:lstStyle/>
+          <a:p>
+            <a:r>
+              <a:t>Duration  4 weeks </a:t>
+            </a:r>
+          </a:p>
+          <a:p>
+            <a:r>
+              <a:t>Dependencies:  User Documentation &amp; Onboarding Guides, Deployment of Backend, App Store Submission (iOS &amp; Android) </a:t>
+            </a:r>
+          </a:p>
+          <a:p>
+            <a:r>
+              <a:t>Status:  Not Started </a:t>
+            </a:r>
+          </a:p>
+          <a:p>
+            <a:r>
+              <a:t>Resources:  Marketing Team </a:t>
+            </a:r>
+          </a:p>
+        </p:txBody>
+      </p:sp>
+    </p:spTree>
+  </p:cSld>
+  <p:clrMapOvr>
+    <a:masterClrMapping/>
+  </p:clrMapOvr>
+</p:sld>
+</file>
+
+<file path=ppt/slides/slide14.xml><?xml version="1.0" encoding="utf-8"?>
+<p:sld xmlns:a="http://schemas.openxmlformats.org/drawingml/2006/main" xmlns:p="http://schemas.openxmlformats.org/presentationml/2006/main" xmlns:r="http://schemas.openxmlformats.org/officeDocument/2006/relationships">
+  <p:cSld>
+    <p:spTree>
+      <p:nvGrpSpPr>
+        <p:cNvPr id="1" name=""/>
+        <p:cNvGrpSpPr/>
+        <p:nvPr/>
+      </p:nvGrpSpPr>
+      <p:grpSpPr/>
+      <p:sp>
+        <p:nvSpPr>
+          <p:cNvPr id="2" name="Title 1"/>
+          <p:cNvSpPr>
+            <a:spLocks noGrp="1"/>
+          </p:cNvSpPr>
+          <p:nvPr>
+            <p:ph type="title"/>
+          </p:nvPr>
+        </p:nvSpPr>
+        <p:spPr/>
+        <p:txBody>
+          <a:bodyPr/>
+          <a:lstStyle/>
+          <a:p>
+            <a:r>
+              <a:t> Project Launch </a:t>
+            </a:r>
+          </a:p>
+        </p:txBody>
+      </p:sp>
+      <p:sp>
+        <p:nvSpPr>
+          <p:cNvPr id="3" name="Content Placeholder 2"/>
+          <p:cNvSpPr>
+            <a:spLocks noGrp="1"/>
+          </p:cNvSpPr>
+          <p:nvPr>
+            <p:ph idx="1"/>
+          </p:nvPr>
+        </p:nvSpPr>
+        <p:spPr/>
+        <p:txBody>
+          <a:bodyPr/>
+          <a:lstStyle/>
+          <a:p>
+            <a:r>
+              <a:t>Duration  1 day </a:t>
+            </a:r>
+          </a:p>
+          <a:p>
+            <a:r>
+              <a:t>Dependencies:  Marketing &amp; Launch Preparation </a:t>
+            </a:r>
+          </a:p>
+          <a:p>
+            <a:r>
+              <a:t>Status:  Not Started </a:t>
+            </a:r>
+          </a:p>
+          <a:p>
+            <a:r>
+              <a:t>Resources:  Project Manager, Marketing Team </a:t>
+            </a:r>
+          </a:p>
+        </p:txBody>
+      </p:sp>
+    </p:spTree>
+  </p:cSld>
+  <p:clrMapOvr>
+    <a:masterClrMapping/>
+  </p:clrMapOvr>
+</p:sld>
+</file>
+
+<file path=ppt/slides/slide15.xml><?xml version="1.0" encoding="utf-8"?>
+<p:sld xmlns:a="http://schemas.openxmlformats.org/drawingml/2006/main" xmlns:p="http://schemas.openxmlformats.org/presentationml/2006/main" xmlns:r="http://schemas.openxmlformats.org/officeDocument/2006/relationships">
+  <p:cSld>
+    <p:spTree>
+      <p:nvGrpSpPr>
+        <p:cNvPr id="1" name=""/>
+        <p:cNvGrpSpPr/>
+        <p:nvPr/>
+      </p:nvGrpSpPr>
+      <p:grpSpPr/>
+      <p:sp>
+        <p:nvSpPr>
+          <p:cNvPr id="2" name="Title 1"/>
+          <p:cNvSpPr>
+            <a:spLocks noGrp="1"/>
+          </p:cNvSpPr>
+          <p:nvPr>
+            <p:ph type="title"/>
+          </p:nvPr>
+        </p:nvSpPr>
+        <p:spPr/>
+        <p:txBody>
+          <a:bodyPr/>
+          <a:lstStyle/>
+          <a:p>
+            <a:r>
+              <a:t> Post-Launch Monitoring &amp; Bug Fixes </a:t>
+            </a:r>
+          </a:p>
+        </p:txBody>
+      </p:sp>
+      <p:sp>
+        <p:nvSpPr>
+          <p:cNvPr id="3" name="Content Placeholder 2"/>
+          <p:cNvSpPr>
+            <a:spLocks noGrp="1"/>
+          </p:cNvSpPr>
+          <p:nvPr>
+            <p:ph idx="1"/>
+          </p:nvPr>
+        </p:nvSpPr>
+        <p:spPr/>
+        <p:txBody>
+          <a:bodyPr/>
+          <a:lstStyle/>
+          <a:p>
+            <a:r>
+              <a:t>Duration  Ongoing </a:t>
+            </a:r>
+          </a:p>
+          <a:p>
+            <a:r>
+              <a:t>Dependencies:  Project Launch </a:t>
+            </a:r>
+          </a:p>
+          <a:p>
+            <a:r>
+              <a:t>Status:  Not Started </a:t>
+            </a:r>
+          </a:p>
+          <a:p>
+            <a:r>
+              <a:t>Resources:  Development Team, QA Team </a:t>
+            </a:r>
+          </a:p>
+        </p:txBody>
+      </p:sp>
+    </p:spTree>
+  </p:cSld>
+  <p:clrMapOvr>
+    <a:masterClrMapping/>
+  </p:clrMapOvr>
+</p:sld>
+</file>
+
+<file path=ppt/slides/slide2.xml><?xml version="1.0" encoding="utf-8"?>
+<p:sld xmlns:a="http://schemas.openxmlformats.org/drawingml/2006/main" xmlns:p="http://schemas.openxmlformats.org/presentationml/2006/main" xmlns:r="http://schemas.openxmlformats.org/officeDocument/2006/relationships">
+  <p:cSld>
+    <p:spTree>
+      <p:nvGrpSpPr>
+        <p:cNvPr id="1" name=""/>
+        <p:cNvGrpSpPr/>
+        <p:nvPr/>
+      </p:nvGrpSpPr>
+      <p:grpSpPr/>
+      <p:sp>
+        <p:nvSpPr>
+          <p:cNvPr id="2" name="Title 1"/>
+          <p:cNvSpPr>
+            <a:spLocks noGrp="1"/>
+          </p:cNvSpPr>
+          <p:nvPr>
+            <p:ph type="title"/>
+          </p:nvPr>
+        </p:nvSpPr>
+        <p:spPr/>
+        <p:txBody>
+          <a:bodyPr/>
+          <a:lstStyle/>
+          <a:p>
+            <a:r>
+              <a:t> Requirements Gathering &amp; Analysis </a:t>
+            </a:r>
+          </a:p>
+        </p:txBody>
+      </p:sp>
+      <p:sp>
+        <p:nvSpPr>
+          <p:cNvPr id="3" name="Content Placeholder 2"/>
+          <p:cNvSpPr>
+            <a:spLocks noGrp="1"/>
+          </p:cNvSpPr>
+          <p:nvPr>
+            <p:ph idx="1"/>
+          </p:nvPr>
+        </p:nvSpPr>
+        <p:spPr/>
+        <p:txBody>
+          <a:bodyPr/>
+          <a:lstStyle/>
+          <a:p>
+            <a:r>
+              <a:t>Duration  2 weeks </a:t>
+            </a:r>
+          </a:p>
+          <a:p>
+            <a:r>
+              <a:t>Dependencies:  Project Initiation &amp; Planning </a:t>
+            </a:r>
+          </a:p>
+          <a:p>
+            <a:r>
+              <a:t>Status:  Not Started </a:t>
+            </a:r>
+          </a:p>
+          <a:p>
+            <a:r>
+              <a:t>Resources:  Project Manager, Development Team </a:t>
+            </a:r>
+          </a:p>
+        </p:txBody>
+      </p:sp>
+    </p:spTree>
+  </p:cSld>
+  <p:clrMapOvr>
+    <a:masterClrMapping/>
+  </p:clrMapOvr>
+</p:sld>
+</file>
+
+<file path=ppt/slides/slide3.xml><?xml version="1.0" encoding="utf-8"?>
+<p:sld xmlns:a="http://schemas.openxmlformats.org/drawingml/2006/main" xmlns:p="http://schemas.openxmlformats.org/presentationml/2006/main" xmlns:r="http://schemas.openxmlformats.org/officeDocument/2006/relationships">
+  <p:cSld>
+    <p:spTree>
+      <p:nvGrpSpPr>
+        <p:cNvPr id="1" name=""/>
+        <p:cNvGrpSpPr/>
+        <p:nvPr/>
+      </p:nvGrpSpPr>
+      <p:grpSpPr/>
+      <p:sp>
+        <p:nvSpPr>
+          <p:cNvPr id="2" name="Title 1"/>
+          <p:cNvSpPr>
+            <a:spLocks noGrp="1"/>
+          </p:cNvSpPr>
+          <p:nvPr>
+            <p:ph type="title"/>
+          </p:nvPr>
+        </p:nvSpPr>
+        <p:spPr/>
+        <p:txBody>
+          <a:bodyPr/>
+          <a:lstStyle/>
+          <a:p>
+            <a:r>
+              <a:t> System Architecture Design </a:t>
+            </a:r>
+          </a:p>
+        </p:txBody>
+      </p:sp>
+      <p:sp>
+        <p:nvSpPr>
+          <p:cNvPr id="3" name="Content Placeholder 2"/>
+          <p:cNvSpPr>
+            <a:spLocks noGrp="1"/>
+          </p:cNvSpPr>
+          <p:nvPr>
+            <p:ph idx="1"/>
+          </p:nvPr>
+        </p:nvSpPr>
+        <p:spPr/>
+        <p:txBody>
+          <a:bodyPr/>
+          <a:lstStyle/>
+          <a:p>
+            <a:r>
+              <a:t>Duration  2 weeks </a:t>
+            </a:r>
+          </a:p>
+          <a:p>
+            <a:r>
+              <a:t>Dependencies:  Requirements Gathering &amp; Analysis </a:t>
+            </a:r>
+          </a:p>
+          <a:p>
+            <a:r>
+              <a:t>Status:  Not Started </a:t>
+            </a:r>
+          </a:p>
+          <a:p>
+            <a:r>
+              <a:t>Resources:  Development Team </a:t>
+            </a:r>
+          </a:p>
+        </p:txBody>
+      </p:sp>
+    </p:spTree>
+  </p:cSld>
+  <p:clrMapOvr>
+    <a:masterClrMapping/>
+  </p:clrMapOvr>
+</p:sld>
+</file>
+
+<file path=ppt/slides/slide4.xml><?xml version="1.0" encoding="utf-8"?>
+<p:sld xmlns:a="http://schemas.openxmlformats.org/drawingml/2006/main" xmlns:p="http://schemas.openxmlformats.org/presentationml/2006/main" xmlns:r="http://schemas.openxmlformats.org/officeDocument/2006/relationships">
+  <p:cSld>
+    <p:spTree>
+      <p:nvGrpSpPr>
+        <p:cNvPr id="1" name=""/>
+        <p:cNvGrpSpPr/>
+        <p:nvPr/>
+      </p:nvGrpSpPr>
+      <p:grpSpPr/>
+      <p:sp>
+        <p:nvSpPr>
+          <p:cNvPr id="2" name="Title 1"/>
+          <p:cNvSpPr>
+            <a:spLocks noGrp="1"/>
+          </p:cNvSpPr>
+          <p:nvPr>
+            <p:ph type="title"/>
+          </p:nvPr>
+        </p:nvSpPr>
+        <p:spPr/>
+        <p:txBody>
+          <a:bodyPr/>
+          <a:lstStyle/>
+          <a:p>
+            <a:r>
+              <a:t> UI/UX Design </a:t>
+            </a:r>
+          </a:p>
+        </p:txBody>
+      </p:sp>
+      <p:sp>
+        <p:nvSpPr>
+          <p:cNvPr id="3" name="Content Placeholder 2"/>
+          <p:cNvSpPr>
+            <a:spLocks noGrp="1"/>
+          </p:cNvSpPr>
+          <p:nvPr>
+            <p:ph idx="1"/>
+          </p:nvPr>
+        </p:nvSpPr>
+        <p:spPr/>
+        <p:txBody>
+          <a:bodyPr/>
+          <a:lstStyle/>
+          <a:p>
+            <a:r>
+              <a:t>Duration  3 weeks </a:t>
+            </a:r>
+          </a:p>
+          <a:p>
+            <a:r>
+              <a:t>Dependencies:  System Architecture Design </a:t>
+            </a:r>
+          </a:p>
+          <a:p>
+            <a:r>
+              <a:t>Status:  Not Started </a:t>
+            </a:r>
+          </a:p>
+          <a:p>
+            <a:r>
+              <a:t>Resources:  UI/UX Designer </a:t>
+            </a:r>
+          </a:p>
+        </p:txBody>
+      </p:sp>
+    </p:spTree>
+  </p:cSld>
+  <p:clrMapOvr>
+    <a:masterClrMapping/>
+  </p:clrMapOvr>
+</p:sld>
+</file>
+
+<file path=ppt/slides/slide5.xml><?xml version="1.0" encoding="utf-8"?>
+<p:sld xmlns:a="http://schemas.openxmlformats.org/drawingml/2006/main" xmlns:p="http://schemas.openxmlformats.org/presentationml/2006/main" xmlns:r="http://schemas.openxmlformats.org/officeDocument/2006/relationships">
+  <p:cSld>
+    <p:spTree>
+      <p:nvGrpSpPr>
+        <p:cNvPr id="1" name=""/>
+        <p:cNvGrpSpPr/>
+        <p:nvPr/>
+      </p:nvGrpSpPr>
+      <p:grpSpPr/>
+      <p:sp>
+        <p:nvSpPr>
+          <p:cNvPr id="2" name="Title 1"/>
+          <p:cNvSpPr>
+            <a:spLocks noGrp="1"/>
+          </p:cNvSpPr>
+          <p:nvPr>
+            <p:ph type="title"/>
+          </p:nvPr>
+        </p:nvSpPr>
+        <p:spPr/>
+        <p:txBody>
+          <a:bodyPr/>
+          <a:lstStyle/>
+          <a:p>
+            <a:r>
+              <a:t> Backend Development </a:t>
+            </a:r>
+          </a:p>
+        </p:txBody>
+      </p:sp>
+      <p:sp>
+        <p:nvSpPr>
+          <p:cNvPr id="3" name="Content Placeholder 2"/>
+          <p:cNvSpPr>
+            <a:spLocks noGrp="1"/>
+          </p:cNvSpPr>
+          <p:nvPr>
+            <p:ph idx="1"/>
+          </p:nvPr>
+        </p:nvSpPr>
+        <p:spPr/>
+        <p:txBody>
+          <a:bodyPr/>
+          <a:lstStyle/>
+          <a:p>
+            <a:r>
+              <a:t>Duration  12 weeks </a:t>
+            </a:r>
+          </a:p>
+          <a:p>
+            <a:r>
+              <a:t>Dependencies:  System Architecture Design </a:t>
+            </a:r>
+          </a:p>
+          <a:p>
+            <a:r>
+              <a:t>Status:  Not Started </a:t>
+            </a:r>
+          </a:p>
+          <a:p>
+            <a:r>
+              <a:t>Resources:  Development Team </a:t>
+            </a:r>
+          </a:p>
+        </p:txBody>
+      </p:sp>
+    </p:spTree>
+  </p:cSld>
+  <p:clrMapOvr>
+    <a:masterClrMapping/>
+  </p:clrMapOvr>
+</p:sld>
+</file>
+
+<file path=ppt/slides/slide6.xml><?xml version="1.0" encoding="utf-8"?>
+<p:sld xmlns:a="http://schemas.openxmlformats.org/drawingml/2006/main" xmlns:p="http://schemas.openxmlformats.org/presentationml/2006/main" xmlns:r="http://schemas.openxmlformats.org/officeDocument/2006/relationships">
+  <p:cSld>
+    <p:spTree>
+      <p:nvGrpSpPr>
+        <p:cNvPr id="1" name=""/>
+        <p:cNvGrpSpPr/>
+        <p:nvPr/>
+      </p:nvGrpSpPr>
+      <p:grpSpPr/>
+      <p:sp>
+        <p:nvSpPr>
+          <p:cNvPr id="2" name="Title 1"/>
+          <p:cNvSpPr>
+            <a:spLocks noGrp="1"/>
+          </p:cNvSpPr>
+          <p:nvPr>
+            <p:ph type="title"/>
+          </p:nvPr>
+        </p:nvSpPr>
+        <p:spPr/>
+        <p:txBody>
+          <a:bodyPr/>
+          <a:lstStyle/>
+          <a:p>
+            <a:r>
+              <a:t> iOS App Development </a:t>
+            </a:r>
+          </a:p>
+        </p:txBody>
+      </p:sp>
+      <p:sp>
+        <p:nvSpPr>
+          <p:cNvPr id="3" name="Content Placeholder 2"/>
+          <p:cNvSpPr>
+            <a:spLocks noGrp="1"/>
+          </p:cNvSpPr>
+          <p:nvPr>
+            <p:ph idx="1"/>
+          </p:nvPr>
+        </p:nvSpPr>
+        <p:spPr/>
+        <p:txBody>
+          <a:bodyPr/>
+          <a:lstStyle/>
+          <a:p>
+            <a:r>
+              <a:t>Duration  10 weeks </a:t>
+            </a:r>
+          </a:p>
+          <a:p>
+            <a:r>
+              <a:t>Dependencies:  UI/UX Design, Backend Development </a:t>
+            </a:r>
+          </a:p>
+          <a:p>
+            <a:r>
+              <a:t>Status:  Not Started </a:t>
+            </a:r>
+          </a:p>
+          <a:p>
+            <a:r>
+              <a:t>Resources:  iOS Development Team </a:t>
+            </a:r>
+          </a:p>
+        </p:txBody>
+      </p:sp>
+    </p:spTree>
+  </p:cSld>
+  <p:clrMapOvr>
+    <a:masterClrMapping/>
+  </p:clrMapOvr>
+</p:sld>
+</file>
+
+<file path=ppt/slides/slide7.xml><?xml version="1.0" encoding="utf-8"?>
+<p:sld xmlns:a="http://schemas.openxmlformats.org/drawingml/2006/main" xmlns:p="http://schemas.openxmlformats.org/presentationml/2006/main" xmlns:r="http://schemas.openxmlformats.org/officeDocument/2006/relationships">
+  <p:cSld>
+    <p:spTree>
+      <p:nvGrpSpPr>
+        <p:cNvPr id="1" name=""/>
+        <p:cNvGrpSpPr/>
+        <p:nvPr/>
+      </p:nvGrpSpPr>
+      <p:grpSpPr/>
+      <p:sp>
+        <p:nvSpPr>
+          <p:cNvPr id="2" name="Title 1"/>
+          <p:cNvSpPr>
+            <a:spLocks noGrp="1"/>
+          </p:cNvSpPr>
+          <p:nvPr>
+            <p:ph type="title"/>
+          </p:nvPr>
+        </p:nvSpPr>
+        <p:spPr/>
+        <p:txBody>
+          <a:bodyPr/>
+          <a:lstStyle/>
+          <a:p>
+            <a:r>
+              <a:t> Android App Development </a:t>
+            </a:r>
+          </a:p>
+        </p:txBody>
+      </p:sp>
+      <p:sp>
+        <p:nvSpPr>
+          <p:cNvPr id="3" name="Content Placeholder 2"/>
+          <p:cNvSpPr>
+            <a:spLocks noGrp="1"/>
+          </p:cNvSpPr>
+          <p:nvPr>
+            <p:ph idx="1"/>
+          </p:nvPr>
+        </p:nvSpPr>
+        <p:spPr/>
+        <p:txBody>
+          <a:bodyPr/>
+          <a:lstStyle/>
+          <a:p>
+            <a:r>
+              <a:t>Duration  10 weeks </a:t>
+            </a:r>
+          </a:p>
+          <a:p>
+            <a:r>
+              <a:t>Dependencies:  UI/UX Design, Backend Development </a:t>
+            </a:r>
+          </a:p>
+          <a:p>
+            <a:r>
+              <a:t>Status:  Not Started </a:t>
+            </a:r>
+          </a:p>
+          <a:p>
+            <a:r>
+              <a:t>Resources:  Android Development Team </a:t>
+            </a:r>
+          </a:p>
+        </p:txBody>
+      </p:sp>
+    </p:spTree>
+  </p:cSld>
+  <p:clrMapOvr>
+    <a:masterClrMapping/>
+  </p:clrMapOvr>
+</p:sld>
+</file>
+
+<file path=ppt/slides/slide8.xml><?xml version="1.0" encoding="utf-8"?>
+<p:sld xmlns:a="http://schemas.openxmlformats.org/drawingml/2006/main" xmlns:p="http://schemas.openxmlformats.org/presentationml/2006/main" xmlns:r="http://schemas.openxmlformats.org/officeDocument/2006/relationships">
+  <p:cSld>
+    <p:spTree>
+      <p:nvGrpSpPr>
+        <p:cNvPr id="1" name=""/>
+        <p:cNvGrpSpPr/>
+        <p:nvPr/>
+      </p:nvGrpSpPr>
+      <p:grpSpPr/>
+      <p:sp>
+        <p:nvSpPr>
+          <p:cNvPr id="2" name="Title 1"/>
+          <p:cNvSpPr>
+            <a:spLocks noGrp="1"/>
+          </p:cNvSpPr>
+          <p:nvPr>
+            <p:ph type="title"/>
+          </p:nvPr>
+        </p:nvSpPr>
+        <p:spPr/>
+        <p:txBody>
+          <a:bodyPr/>
+          <a:lstStyle/>
+          <a:p>
+            <a:r>
+              <a:t> Payment Gateway Integration </a:t>
+            </a:r>
+          </a:p>
+        </p:txBody>
+      </p:sp>
+      <p:sp>
+        <p:nvSpPr>
+          <p:cNvPr id="3" name="Content Placeholder 2"/>
+          <p:cNvSpPr>
+            <a:spLocks noGrp="1"/>
+          </p:cNvSpPr>
+          <p:nvPr>
+            <p:ph idx="1"/>
+          </p:nvPr>
+        </p:nvSpPr>
+        <p:spPr/>
+        <p:txBody>
+          <a:bodyPr/>
+          <a:lstStyle/>
+          <a:p>
+            <a:r>
+              <a:t>Duration  4 weeks </a:t>
+            </a:r>
+          </a:p>
+          <a:p>
+            <a:r>
+              <a:t>Dependencies:  Backend Development </a:t>
+            </a:r>
+          </a:p>
+          <a:p>
+            <a:r>
+              <a:t>Status:  Not Started </a:t>
+            </a:r>
+          </a:p>
+          <a:p>
+            <a:r>
+              <a:t>Resources:  Development Team </a:t>
+            </a:r>
+          </a:p>
+        </p:txBody>
+      </p:sp>
+    </p:spTree>
+  </p:cSld>
+  <p:clrMapOvr>
+    <a:masterClrMapping/>
+  </p:clrMapOvr>
+</p:sld>
+</file>
+
+<file path=ppt/slides/slide9.xml><?xml version="1.0" encoding="utf-8"?>
+<p:sld xmlns:a="http://schemas.openxmlformats.org/drawingml/2006/main" xmlns:p="http://schemas.openxmlformats.org/presentationml/2006/main" xmlns:r="http://schemas.openxmlformats.org/officeDocument/2006/relationships">
+  <p:cSld>
+    <p:spTree>
+      <p:nvGrpSpPr>
+        <p:cNvPr id="1" name=""/>
+        <p:cNvGrpSpPr/>
+        <p:nvPr/>
+      </p:nvGrpSpPr>
+      <p:grpSpPr/>
+      <p:sp>
+        <p:nvSpPr>
+          <p:cNvPr id="2" name="Title 1"/>
+          <p:cNvSpPr>
+            <a:spLocks noGrp="1"/>
+          </p:cNvSpPr>
+          <p:nvPr>
+            <p:ph type="title"/>
+          </p:nvPr>
+        </p:nvSpPr>
+        <p:spPr/>
+        <p:txBody>
+          <a:bodyPr/>
+          <a:lstStyle/>
+          <a:p>
+            <a:r>
+              <a:t> Quality Assurance &amp; Testing </a:t>
+            </a:r>
+          </a:p>
+        </p:txBody>
+      </p:sp>
+      <p:sp>
+        <p:nvSpPr>
+          <p:cNvPr id="3" name="Content Placeholder 2"/>
+          <p:cNvSpPr>
+            <a:spLocks noGrp="1"/>
+          </p:cNvSpPr>
+          <p:nvPr>
+            <p:ph idx="1"/>
+          </p:nvPr>
+        </p:nvSpPr>
+        <p:spPr/>
+        <p:txBody>
+          <a:bodyPr/>
+          <a:lstStyle/>
+          <a:p>
+            <a:r>
+              <a:t>Duration  6 weeks </a:t>
+            </a:r>
+          </a:p>
+          <a:p>
+            <a:r>
+              <a:t>Dependencies:  iOS App Development, Android App Development, Payment Gateway Integration </a:t>
+            </a:r>
+          </a:p>
+          <a:p>
+            <a:r>
+              <a:t>Status:  Not Started </a:t>
+            </a:r>
+          </a:p>
+          <a:p>
+            <a:r>
+              <a:t>Resources:  QA Team </a:t>
+            </a:r>
+          </a:p>
+        </p:txBody>
+      </p:sp>
+    </p:spTree>
+  </p:cSld>
+  <p:clrMapOvr>
+    <a:masterClrMapping/>
+  </p:clrMapOvr>
+</p:sld>
 </file>
 
 <file path=ppt/theme/theme1.xml><?xml version="1.0" encoding="utf-8"?>

</xml_diff>